<commit_message>
Boost your personal productivity with tmux.
</commit_message>
<xml_diff>
--- a/Thumbnails/00-Traap-Thubnail.pptx
+++ b/Thumbnails/00-Traap-Thubnail.pptx
@@ -3226,8 +3226,8 @@
         </p:nvSpPr>
         <p:spPr bwMode="auto">
           <a:xfrm flipH="0" flipV="0">
-            <a:off x="4540774" y="687245"/>
-            <a:ext cx="6162637" cy="823320"/>
+            <a:off x="4540772" y="687243"/>
+            <a:ext cx="6642577" cy="823320"/>
           </a:xfrm>
           <a:prstGeom prst="rect">
             <a:avLst/>
@@ -3250,7 +3250,7 @@
                   </a:schemeClr>
                 </a:solidFill>
               </a:rPr>
-              <a:t>#18 Neovim</a:t>
+              <a:t>#21 Archlinux &amp; WSL2</a:t>
             </a:r>
             <a:endParaRPr sz="4800">
               <a:solidFill>
@@ -3270,8 +3270,8 @@
         </p:nvSpPr>
         <p:spPr bwMode="auto">
           <a:xfrm flipH="0" flipV="0">
-            <a:off x="5868728" y="1510566"/>
-            <a:ext cx="6023290" cy="518519"/>
+            <a:off x="5868726" y="1510564"/>
+            <a:ext cx="6037328" cy="518519"/>
           </a:xfrm>
           <a:prstGeom prst="rect">
             <a:avLst/>
@@ -3294,7 +3294,7 @@
                   </a:schemeClr>
                 </a:solidFill>
               </a:rPr>
-              <a:t>Simple: LazyVim  Customization </a:t>
+              <a:t>TMUX, Neovim, and Vim </a:t>
             </a:r>
             <a:r>
               <a:rPr sz="3600">
@@ -3324,8 +3324,8 @@
         </p:nvSpPr>
         <p:spPr bwMode="auto">
           <a:xfrm flipH="0" flipV="0">
-            <a:off x="7112282" y="2109143"/>
-            <a:ext cx="4355942" cy="488039"/>
+            <a:off x="7112280" y="2109141"/>
+            <a:ext cx="4388700" cy="884279"/>
           </a:xfrm>
           <a:prstGeom prst="rect">
             <a:avLst/>
@@ -3346,7 +3346,7 @@
                   <a:srgbClr val="FFFF00"/>
                 </a:solidFill>
               </a:rPr>
-              <a:t>todo-comments.nvim</a:t>
+              <a:t>Answering a Viewers Question</a:t>
             </a:r>
             <a:endParaRPr sz="4800">
               <a:solidFill>

</xml_diff>

<commit_message>
Video 27 tmux productivity.
</commit_message>
<xml_diff>
--- a/Thumbnails/00-Traap-Thubnail.pptx
+++ b/Thumbnails/00-Traap-Thubnail.pptx
@@ -3227,7 +3227,7 @@
         <p:spPr bwMode="auto">
           <a:xfrm flipH="0" flipV="0">
             <a:off x="4540770" y="687240"/>
-            <a:ext cx="6986892" cy="823320"/>
+            <a:ext cx="6993371" cy="823320"/>
           </a:xfrm>
           <a:prstGeom prst="rect">
             <a:avLst/>
@@ -3250,7 +3250,7 @@
                   </a:schemeClr>
                 </a:solidFill>
               </a:rPr>
-              <a:t>#25 Finding a Pattern</a:t>
+              <a:t>#26 TMUX Productivity</a:t>
             </a:r>
             <a:endParaRPr sz="4800">
               <a:solidFill>
@@ -3270,8 +3270,8 @@
         </p:nvSpPr>
         <p:spPr bwMode="auto">
           <a:xfrm flipH="0" flipV="0">
-            <a:off x="5868722" y="1510560"/>
-            <a:ext cx="6153244" cy="518519"/>
+            <a:off x="5868721" y="1510560"/>
+            <a:ext cx="6175203" cy="518519"/>
           </a:xfrm>
           <a:prstGeom prst="rect">
             <a:avLst/>
@@ -3294,7 +3294,7 @@
                   </a:schemeClr>
                 </a:solidFill>
               </a:rPr>
-              <a:t>fzf as an interactive Ripgrep launcher</a:t>
+              <a:t>Toggle TMUX sessions.</a:t>
             </a:r>
             <a:endParaRPr sz="4800">
               <a:solidFill>
@@ -3315,7 +3315,7 @@
         <p:spPr bwMode="auto">
           <a:xfrm flipH="0" flipV="0">
             <a:off x="7112277" y="2109141"/>
-            <a:ext cx="4530537" cy="884279"/>
+            <a:ext cx="4554657" cy="1280520"/>
           </a:xfrm>
           <a:prstGeom prst="rect">
             <a:avLst/>
@@ -3336,7 +3336,43 @@
                   <a:srgbClr val="FFFF00"/>
                 </a:solidFill>
               </a:rPr>
-              <a:t>How I quickly find text and launch Neovim</a:t>
+              <a:t>Alt-N Toggle Neovim</a:t>
+            </a:r>
+            <a:endParaRPr sz="2600">
+              <a:solidFill>
+                <a:srgbClr val="FFFF00"/>
+              </a:solidFill>
+            </a:endParaRPr>
+          </a:p>
+          <a:p>
+            <a:pPr>
+              <a:defRPr/>
+            </a:pPr>
+            <a:r>
+              <a:rPr sz="2600">
+                <a:solidFill>
+                  <a:srgbClr val="FFFF00"/>
+                </a:solidFill>
+              </a:rPr>
+              <a:t>Alt-U Toggle Upgrade</a:t>
+            </a:r>
+            <a:endParaRPr sz="2600">
+              <a:solidFill>
+                <a:srgbClr val="FFFF00"/>
+              </a:solidFill>
+            </a:endParaRPr>
+          </a:p>
+          <a:p>
+            <a:pPr>
+              <a:defRPr/>
+            </a:pPr>
+            <a:r>
+              <a:rPr sz="2600">
+                <a:solidFill>
+                  <a:srgbClr val="FFFF00"/>
+                </a:solidFill>
+              </a:rPr>
+              <a:t>Alt-Y Toggle YouTube</a:t>
             </a:r>
             <a:endParaRPr sz="2600">
               <a:solidFill>

</xml_diff>

<commit_message>
Video 29 and 30 pictures.
</commit_message>
<xml_diff>
--- a/Thumbnails/00-Traap-Thubnail.pptx
+++ b/Thumbnails/00-Traap-Thubnail.pptx
@@ -4,8 +4,11 @@
   <p:sldMasterIdLst>
     <p:sldMasterId id="2147483648" r:id="rId1"/>
   </p:sldMasterIdLst>
+  <p:notesMasterIdLst>
+    <p:notesMasterId r:id="rId5"/>
+  </p:notesMasterIdLst>
   <p:sldIdLst>
-    <p:sldId id="256" r:id="rId3"/>
+    <p:sldId id="256" r:id="rId4"/>
   </p:sldIdLst>
   <p:sldSz cx="12192000" cy="6858000"/>
   <p:notesSz cx="12192000" cy="6858000"/>
@@ -105,6 +108,408 @@
     </a:lvl9pPr>
   </p:defaultTextStyle>
 </p:presentation>
+</file>
+
+<file path=ppt/notesMasters/notesMaster1.xml><?xml version="1.0" encoding="utf-8"?>
+<p:notesMaster xmlns:a="http://schemas.openxmlformats.org/drawingml/2006/main" xmlns:r="http://schemas.openxmlformats.org/officeDocument/2006/relationships" xmlns:p="http://schemas.openxmlformats.org/presentationml/2006/main">
+  <p:cSld name="">
+    <p:bg>
+      <p:bgRef idx="1001">
+        <a:schemeClr val="bg1"/>
+      </p:bgRef>
+    </p:bg>
+    <p:spTree>
+      <p:nvGrpSpPr>
+        <p:cNvPr id="1" name=""/>
+        <p:cNvGrpSpPr/>
+        <p:nvPr/>
+      </p:nvGrpSpPr>
+      <p:grpSpPr bwMode="auto">
+        <a:xfrm>
+          <a:off x="0" y="0"/>
+          <a:ext cx="0" cy="0"/>
+          <a:chOff x="0" y="0"/>
+          <a:chExt cx="0" cy="0"/>
+        </a:xfrm>
+      </p:grpSpPr>
+      <p:sp>
+        <p:nvSpPr>
+          <p:cNvPr id="2" name="Header Placeholder 1"/>
+          <p:cNvSpPr>
+            <a:spLocks noGrp="1"/>
+          </p:cNvSpPr>
+          <p:nvPr>
+            <p:ph type="hdr" sz="quarter"/>
+          </p:nvPr>
+        </p:nvSpPr>
+        <p:spPr bwMode="auto">
+          <a:xfrm>
+            <a:off x="0" y="0"/>
+            <a:ext cx="2971800" cy="458788"/>
+          </a:xfrm>
+          <a:prstGeom prst="rect">
+            <a:avLst/>
+          </a:prstGeom>
+        </p:spPr>
+        <p:txBody>
+          <a:bodyPr vert="horz" lIns="91440" tIns="45720" rIns="91440" bIns="45720" rtlCol="0" anchor="ctr"/>
+          <a:lstStyle>
+            <a:lvl1pPr algn="l">
+              <a:defRPr sz="1200"/>
+            </a:lvl1pPr>
+          </a:lstStyle>
+          <a:p>
+            <a:pPr>
+              <a:defRPr/>
+            </a:pPr>
+            <a:endParaRPr/>
+          </a:p>
+        </p:txBody>
+      </p:sp>
+      <p:sp>
+        <p:nvSpPr>
+          <p:cNvPr id="3" name="Date Placeholder 2"/>
+          <p:cNvSpPr>
+            <a:spLocks noGrp="1"/>
+          </p:cNvSpPr>
+          <p:nvPr>
+            <p:ph type="dt" idx="2"/>
+          </p:nvPr>
+        </p:nvSpPr>
+        <p:spPr bwMode="auto">
+          <a:xfrm>
+            <a:off x="3884613" y="0"/>
+            <a:ext cx="2971800" cy="458788"/>
+          </a:xfrm>
+          <a:prstGeom prst="rect">
+            <a:avLst/>
+          </a:prstGeom>
+        </p:spPr>
+        <p:txBody>
+          <a:bodyPr vert="horz" lIns="91440" tIns="45720" rIns="91440" bIns="45720" rtlCol="0" anchor="ctr"/>
+          <a:lstStyle>
+            <a:lvl1pPr algn="r">
+              <a:defRPr sz="1200"/>
+            </a:lvl1pPr>
+          </a:lstStyle>
+          <a:p>
+            <a:pPr>
+              <a:defRPr/>
+            </a:pPr>
+            <a:endParaRPr/>
+          </a:p>
+        </p:txBody>
+      </p:sp>
+      <p:sp>
+        <p:nvSpPr>
+          <p:cNvPr id="3" name="Date Placeholder 2"/>
+          <p:cNvSpPr>
+            <a:spLocks noGrp="1"/>
+          </p:cNvSpPr>
+          <p:nvPr>
+            <p:ph type="dt" idx="3"/>
+          </p:nvPr>
+        </p:nvSpPr>
+        <p:spPr bwMode="auto">
+          <a:xfrm>
+            <a:off x="3884613" y="0"/>
+            <a:ext cx="2971800" cy="458788"/>
+          </a:xfrm>
+          <a:prstGeom prst="rect">
+            <a:avLst/>
+          </a:prstGeom>
+        </p:spPr>
+        <p:txBody>
+          <a:bodyPr vert="horz" lIns="91440" tIns="45720" rIns="91440" bIns="45720" rtlCol="0" anchor="ctr"/>
+          <a:lstStyle>
+            <a:lvl1pPr algn="r">
+              <a:defRPr sz="1200"/>
+            </a:lvl1pPr>
+          </a:lstStyle>
+          <a:p>
+            <a:pPr>
+              <a:defRPr/>
+            </a:pPr>
+            <a:endParaRPr/>
+          </a:p>
+        </p:txBody>
+      </p:sp>
+      <p:sp>
+        <p:nvSpPr>
+          <p:cNvPr id="5" name="Notes Placeholder 4"/>
+          <p:cNvSpPr>
+            <a:spLocks noGrp="1"/>
+          </p:cNvSpPr>
+          <p:nvPr>
+            <p:ph type="body" sz="quarter" idx="1"/>
+          </p:nvPr>
+        </p:nvSpPr>
+        <p:spPr bwMode="auto">
+          <a:xfrm>
+            <a:off x="685800" y="4400550"/>
+            <a:ext cx="5486400" cy="3600450"/>
+          </a:xfrm>
+          <a:prstGeom prst="rect">
+            <a:avLst/>
+          </a:prstGeom>
+        </p:spPr>
+        <p:txBody>
+          <a:bodyPr vert="horz" lIns="91440" tIns="45720" rIns="91440" bIns="45720" rtlCol="0" anchor="ctr"/>
+          <a:lstStyle/>
+          <a:p>
+            <a:pPr>
+              <a:defRPr/>
+            </a:pPr>
+            <a:endParaRPr/>
+          </a:p>
+        </p:txBody>
+      </p:sp>
+      <p:sp>
+        <p:nvSpPr>
+          <p:cNvPr id="6" name="Footer Placeholder 5"/>
+          <p:cNvSpPr>
+            <a:spLocks noGrp="1"/>
+          </p:cNvSpPr>
+          <p:nvPr>
+            <p:ph type="ftr" sz="quarter" idx="4"/>
+          </p:nvPr>
+        </p:nvSpPr>
+        <p:spPr bwMode="auto">
+          <a:xfrm>
+            <a:off x="0" y="8685213"/>
+            <a:ext cx="2971800" cy="458787"/>
+          </a:xfrm>
+          <a:prstGeom prst="rect">
+            <a:avLst/>
+          </a:prstGeom>
+        </p:spPr>
+        <p:txBody>
+          <a:bodyPr vert="horz" lIns="91440" tIns="45720" rIns="91440" bIns="45720" rtlCol="0" anchor="b"/>
+          <a:lstStyle>
+            <a:lvl1pPr algn="l">
+              <a:defRPr sz="1200"/>
+            </a:lvl1pPr>
+          </a:lstStyle>
+          <a:p>
+            <a:pPr>
+              <a:defRPr/>
+            </a:pPr>
+            <a:endParaRPr/>
+          </a:p>
+        </p:txBody>
+      </p:sp>
+      <p:sp>
+        <p:nvSpPr>
+          <p:cNvPr id="7" name="Slide Number Placeholder 6"/>
+          <p:cNvSpPr>
+            <a:spLocks noGrp="1"/>
+          </p:cNvSpPr>
+          <p:nvPr>
+            <p:ph type="sldNum" sz="quarter" idx="10"/>
+          </p:nvPr>
+        </p:nvSpPr>
+        <p:spPr bwMode="auto">
+          <a:xfrm>
+            <a:off x="3884613" y="8685213"/>
+            <a:ext cx="2971800" cy="458787"/>
+          </a:xfrm>
+          <a:prstGeom prst="rect">
+            <a:avLst/>
+          </a:prstGeom>
+        </p:spPr>
+        <p:txBody>
+          <a:bodyPr vert="horz" lIns="91440" tIns="45720" rIns="91440" bIns="45720" rtlCol="0" anchor="b"/>
+          <a:lstStyle>
+            <a:lvl1pPr algn="r">
+              <a:defRPr sz="1200"/>
+            </a:lvl1pPr>
+          </a:lstStyle>
+          <a:p>
+            <a:pPr>
+              <a:defRPr/>
+            </a:pPr>
+            <a:endParaRPr/>
+          </a:p>
+        </p:txBody>
+      </p:sp>
+    </p:spTree>
+  </p:cSld>
+  <p:clrMap bg1="lt1" tx1="dk1" bg2="lt2" tx2="dk2" accent1="accent1" accent2="accent2" accent3="accent3" accent4="accent4" accent5="accent5" accent6="accent6" hlink="hlink" folHlink="folHlink"/>
+  <p:notesStyle>
+    <a:lvl1pPr marL="0" algn="l" defTabSz="914400">
+      <a:defRPr sz="1200">
+        <a:solidFill>
+          <a:schemeClr val="tx1"/>
+        </a:solidFill>
+        <a:latin typeface="+mn-lt"/>
+        <a:ea typeface="+mn-ea"/>
+        <a:cs typeface="+mn-cs"/>
+      </a:defRPr>
+    </a:lvl1pPr>
+    <a:lvl2pPr marL="457200" algn="l" defTabSz="914400">
+      <a:defRPr sz="1200">
+        <a:solidFill>
+          <a:schemeClr val="tx1"/>
+        </a:solidFill>
+        <a:latin typeface="+mn-lt"/>
+        <a:ea typeface="+mn-ea"/>
+        <a:cs typeface="+mn-cs"/>
+      </a:defRPr>
+    </a:lvl2pPr>
+    <a:lvl3pPr marL="914400" algn="l" defTabSz="914400">
+      <a:defRPr sz="1200">
+        <a:solidFill>
+          <a:schemeClr val="tx1"/>
+        </a:solidFill>
+        <a:latin typeface="+mn-lt"/>
+        <a:ea typeface="+mn-ea"/>
+        <a:cs typeface="+mn-cs"/>
+      </a:defRPr>
+    </a:lvl3pPr>
+    <a:lvl4pPr marL="1371600" algn="l" defTabSz="914400">
+      <a:defRPr sz="1200">
+        <a:solidFill>
+          <a:schemeClr val="tx1"/>
+        </a:solidFill>
+        <a:latin typeface="+mn-lt"/>
+        <a:ea typeface="+mn-ea"/>
+        <a:cs typeface="+mn-cs"/>
+      </a:defRPr>
+    </a:lvl4pPr>
+    <a:lvl5pPr marL="1828800" algn="l" defTabSz="914400">
+      <a:defRPr sz="1200">
+        <a:solidFill>
+          <a:schemeClr val="tx1"/>
+        </a:solidFill>
+        <a:latin typeface="+mn-lt"/>
+        <a:ea typeface="+mn-ea"/>
+        <a:cs typeface="+mn-cs"/>
+      </a:defRPr>
+    </a:lvl5pPr>
+    <a:lvl6pPr marL="2286000" algn="l" defTabSz="914400">
+      <a:defRPr sz="1200">
+        <a:solidFill>
+          <a:schemeClr val="tx1"/>
+        </a:solidFill>
+        <a:latin typeface="+mn-lt"/>
+        <a:ea typeface="+mn-ea"/>
+        <a:cs typeface="+mn-cs"/>
+      </a:defRPr>
+    </a:lvl6pPr>
+    <a:lvl7pPr marL="2743200" algn="l" defTabSz="914400">
+      <a:defRPr sz="1200">
+        <a:solidFill>
+          <a:schemeClr val="tx1"/>
+        </a:solidFill>
+        <a:latin typeface="+mn-lt"/>
+        <a:ea typeface="+mn-ea"/>
+        <a:cs typeface="+mn-cs"/>
+      </a:defRPr>
+    </a:lvl7pPr>
+    <a:lvl8pPr marL="3200400" algn="l" defTabSz="914400">
+      <a:defRPr sz="1200">
+        <a:solidFill>
+          <a:schemeClr val="tx1"/>
+        </a:solidFill>
+        <a:latin typeface="+mn-lt"/>
+        <a:ea typeface="+mn-ea"/>
+        <a:cs typeface="+mn-cs"/>
+      </a:defRPr>
+    </a:lvl8pPr>
+    <a:lvl9pPr marL="3657600" algn="l" defTabSz="914400">
+      <a:defRPr sz="1200">
+        <a:solidFill>
+          <a:schemeClr val="tx1"/>
+        </a:solidFill>
+        <a:latin typeface="+mn-lt"/>
+        <a:ea typeface="+mn-ea"/>
+        <a:cs typeface="+mn-cs"/>
+      </a:defRPr>
+    </a:lvl9pPr>
+  </p:notesStyle>
+</p:notesMaster>
+</file>
+
+<file path=ppt/notesSlides/notesSlide1.xml><?xml version="1.0" encoding="utf-8"?>
+<p:notes xmlns:a="http://schemas.openxmlformats.org/drawingml/2006/main" xmlns:r="http://schemas.openxmlformats.org/officeDocument/2006/relationships" xmlns:p="http://schemas.openxmlformats.org/presentationml/2006/main" xmlns:m="http://schemas.openxmlformats.org/officeDocument/2006/math" xmlns:w="http://schemas.openxmlformats.org/wordprocessingml/2006/main">
+  <p:cSld name="">
+    <p:spTree>
+      <p:nvGrpSpPr>
+        <p:cNvPr id="1" name=""/>
+        <p:cNvGrpSpPr/>
+        <p:nvPr/>
+      </p:nvGrpSpPr>
+      <p:grpSpPr bwMode="auto">
+        <a:xfrm>
+          <a:off x="0" y="0"/>
+          <a:ext cx="0" cy="0"/>
+          <a:chOff x="0" y="0"/>
+          <a:chExt cx="0" cy="0"/>
+        </a:xfrm>
+      </p:grpSpPr>
+      <p:sp>
+        <p:nvSpPr>
+          <p:cNvPr id="2" name="Slide Image Placeholder 1"/>
+          <p:cNvSpPr>
+            <a:spLocks noChangeAspect="1" noGrp="1" noRot="1"/>
+          </p:cNvSpPr>
+          <p:nvPr>
+            <p:ph type="sldImg"/>
+          </p:nvPr>
+        </p:nvSpPr>
+        <p:spPr bwMode="auto"/>
+      </p:sp>
+      <p:sp>
+        <p:nvSpPr>
+          <p:cNvPr id="3" name="Notes Placeholder 2"/>
+          <p:cNvSpPr>
+            <a:spLocks noGrp="1"/>
+          </p:cNvSpPr>
+          <p:nvPr>
+            <p:ph type="body" idx="1"/>
+          </p:nvPr>
+        </p:nvSpPr>
+        <p:spPr bwMode="auto"/>
+        <p:txBody>
+          <a:bodyPr/>
+          <a:lstStyle/>
+          <a:p>
+            <a:pPr>
+              <a:defRPr/>
+            </a:pPr>
+            <a:endParaRPr/>
+          </a:p>
+        </p:txBody>
+      </p:sp>
+      <p:sp>
+        <p:nvSpPr>
+          <p:cNvPr id="4" name="Slide Number Placeholder 3"/>
+          <p:cNvSpPr>
+            <a:spLocks noGrp="1"/>
+          </p:cNvSpPr>
+          <p:nvPr>
+            <p:ph type="sldNum" sz="quarter" idx="10"/>
+          </p:nvPr>
+        </p:nvSpPr>
+        <p:spPr bwMode="auto"/>
+        <p:txBody>
+          <a:bodyPr/>
+          <a:lstStyle/>
+          <a:p>
+            <a:pPr>
+              <a:defRPr/>
+            </a:pPr>
+            <a:fld id="{5E8D3A65-94E5-0983-A3A6-8848A1D8C3E0}" type="slidenum">
+              <a:rPr/>
+              <a:t/>
+            </a:fld>
+            <a:endParaRPr/>
+          </a:p>
+        </p:txBody>
+      </p:sp>
+    </p:spTree>
+  </p:cSld>
+</p:notes>
 </file>
 
 <file path=ppt/slideLayouts/slideLayout1.xml><?xml version="1.0" encoding="utf-8"?>
@@ -3205,7 +3610,7 @@
           <p:nvPr/>
         </p:nvPicPr>
         <p:blipFill>
-          <a:blip r:embed="rId2"/>
+          <a:blip r:embed="rId3"/>
           <a:stretch/>
         </p:blipFill>
         <p:spPr bwMode="auto">
@@ -3227,7 +3632,7 @@
         <p:spPr bwMode="auto">
           <a:xfrm flipH="0" flipV="0">
             <a:off x="4540770" y="687240"/>
-            <a:ext cx="7005249" cy="823320"/>
+            <a:ext cx="7043408" cy="1554840"/>
           </a:xfrm>
           <a:prstGeom prst="rect">
             <a:avLst/>
@@ -3250,7 +3655,7 @@
                   </a:schemeClr>
                 </a:solidFill>
               </a:rPr>
-              <a:t>#28 DocBld &amp; NewDoc</a:t>
+              <a:t>#30 TMXU &amp; Neovim</a:t>
             </a:r>
             <a:endParaRPr sz="4800">
               <a:solidFill>
@@ -3260,41 +3665,19 @@
               </a:solidFill>
             </a:endParaRPr>
           </a:p>
-        </p:txBody>
-      </p:sp>
-      <p:sp>
-        <p:nvSpPr>
-          <p:cNvPr id="1414364764" name=""/>
-          <p:cNvSpPr txBox="1"/>
-          <p:nvPr/>
-        </p:nvSpPr>
-        <p:spPr bwMode="auto">
-          <a:xfrm flipH="0" flipV="0">
-            <a:off x="5868720" y="1510560"/>
-            <a:ext cx="6213001" cy="518519"/>
-          </a:xfrm>
-          <a:prstGeom prst="rect">
-            <a:avLst/>
-          </a:prstGeom>
-          <a:noFill/>
-        </p:spPr>
-        <p:txBody>
-          <a:bodyPr vertOverflow="overflow" horzOverflow="overflow" vert="horz" wrap="square" lIns="91440" tIns="45720" rIns="91440" bIns="45720" numCol="1" spcCol="0" rtlCol="0" fromWordArt="0" anchor="t" anchorCtr="0" forceAA="0" upright="0" compatLnSpc="0">
-            <a:spAutoFit/>
-          </a:bodyPr>
-          <a:p>
-            <a:pPr>
-              <a:defRPr/>
-            </a:pPr>
-            <a:r>
-              <a:rPr sz="2800">
+          <a:p>
+            <a:pPr>
+              <a:defRPr/>
+            </a:pPr>
+            <a:r>
+              <a:rPr sz="4800">
                 <a:solidFill>
                   <a:schemeClr val="accent5">
                     <a:lumMod val="75000"/>
                   </a:schemeClr>
                 </a:solidFill>
               </a:rPr>
-              <a:t>Precursor to Video #29</a:t>
+              <a:t>        Navigation     </a:t>
             </a:r>
             <a:endParaRPr sz="4800">
               <a:solidFill>
@@ -3308,14 +3691,14 @@
       </p:sp>
       <p:sp>
         <p:nvSpPr>
-          <p:cNvPr id="311914269" name=""/>
+          <p:cNvPr id="1414364764" name=""/>
           <p:cNvSpPr txBox="1"/>
           <p:nvPr/>
         </p:nvSpPr>
         <p:spPr bwMode="auto">
           <a:xfrm flipH="0" flipV="0">
-            <a:off x="7112277" y="2109141"/>
-            <a:ext cx="4664095" cy="1280520"/>
+            <a:off x="5868720" y="1510560"/>
+            <a:ext cx="6228480" cy="823320"/>
           </a:xfrm>
           <a:prstGeom prst="rect">
             <a:avLst/>
@@ -3330,13 +3713,47 @@
             <a:pPr>
               <a:defRPr/>
             </a:pPr>
+            <a:endParaRPr sz="4800">
+              <a:solidFill>
+                <a:schemeClr val="accent5">
+                  <a:lumMod val="75000"/>
+                </a:schemeClr>
+              </a:solidFill>
+            </a:endParaRPr>
+          </a:p>
+        </p:txBody>
+      </p:sp>
+      <p:sp>
+        <p:nvSpPr>
+          <p:cNvPr id="311914269" name=""/>
+          <p:cNvSpPr txBox="1"/>
+          <p:nvPr/>
+        </p:nvSpPr>
+        <p:spPr bwMode="auto">
+          <a:xfrm flipH="0" flipV="0">
+            <a:off x="7112277" y="2242080"/>
+            <a:ext cx="4684614" cy="884279"/>
+          </a:xfrm>
+          <a:prstGeom prst="rect">
+            <a:avLst/>
+          </a:prstGeom>
+          <a:noFill/>
+        </p:spPr>
+        <p:txBody>
+          <a:bodyPr vertOverflow="overflow" horzOverflow="overflow" vert="horz" wrap="square" lIns="91440" tIns="45720" rIns="91440" bIns="45720" numCol="1" spcCol="0" rtlCol="0" fromWordArt="0" anchor="t" anchorCtr="0" forceAA="0" upright="0" compatLnSpc="0">
+            <a:spAutoFit/>
+          </a:bodyPr>
+          <a:p>
+            <a:pPr>
+              <a:defRPr/>
+            </a:pPr>
             <a:r>
               <a:rPr sz="2600">
                 <a:solidFill>
                   <a:srgbClr val="FFFF00"/>
                 </a:solidFill>
               </a:rPr>
-              <a:t>Behind the scenes</a:t>
+              <a:t>With Ctrl-[H,J,K,L]</a:t>
             </a:r>
             <a:endParaRPr sz="2600">
               <a:solidFill>
@@ -3345,39 +3762,9 @@
             </a:endParaRPr>
           </a:p>
           <a:p>
-            <a:pPr marL="371994" indent="-371994">
-              <a:buFont typeface="Arial"/>
-              <a:buChar char="•"/>
-              <a:defRPr/>
-            </a:pPr>
-            <a:r>
-              <a:rPr sz="2600">
-                <a:solidFill>
-                  <a:srgbClr val="FFFF00"/>
-                </a:solidFill>
-              </a:rPr>
-              <a:t>docbld </a:t>
-            </a:r>
-            <a:endParaRPr sz="2600">
-              <a:solidFill>
-                <a:srgbClr val="FFFF00"/>
-              </a:solidFill>
-            </a:endParaRPr>
-          </a:p>
-          <a:p>
-            <a:pPr marL="371994" indent="-371994">
-              <a:buFont typeface="Arial"/>
-              <a:buChar char="•"/>
-              <a:defRPr/>
-            </a:pPr>
-            <a:r>
-              <a:rPr sz="2600">
-                <a:solidFill>
-                  <a:srgbClr val="FFFF00"/>
-                </a:solidFill>
-              </a:rPr>
-              <a:t>newdoc</a:t>
-            </a:r>
+            <a:pPr>
+              <a:defRPr/>
+            </a:pPr>
             <a:endParaRPr sz="2600">
               <a:solidFill>
                 <a:srgbClr val="FFFF00"/>
@@ -3392,7 +3779,7 @@
     <a:masterClrMapping/>
   </p:clrMapOvr>
   <mc:AlternateContent xmlns:mc="http://schemas.openxmlformats.org/markup-compatibility/2006">
-    <mc:Choice xmlns:p14="http://schemas.microsoft.com/office/powerpoint/2010/main" Requires="p14">
+    <mc:Choice xmlns:p159="http://schemas.microsoft.com/office/powerpoint/2015/09/main" xmlns:p14="http://schemas.microsoft.com/office/powerpoint/2010/main" Requires="p159">
       <p:transition p14:dur="2000" advClick="1"/>
     </mc:Choice>
     <mc:Fallback>
@@ -3607,4 +3994,211 @@
   </a:themeElements>
   <a:objectDefaults/>
 </a:theme>
+</file>
+
+<file path=ppt/theme/theme2.xml><?xml version="1.0" encoding="utf-8"?>
+<a:theme xmlns:a="http://schemas.openxmlformats.org/drawingml/2006/main" xmlns:r="http://schemas.openxmlformats.org/officeDocument/2006/relationships" xmlns:p="http://schemas.openxmlformats.org/presentationml/2006/main" name="Office Theme">
+  <a:themeElements>
+    <a:clrScheme name="New Office">
+      <a:dk1>
+        <a:sysClr val="windowText" lastClr="000000"/>
+      </a:dk1>
+      <a:lt1>
+        <a:sysClr val="window" lastClr="FFFFFF"/>
+      </a:lt1>
+      <a:dk2>
+        <a:srgbClr val="44546A"/>
+      </a:dk2>
+      <a:lt2>
+        <a:srgbClr val="E7E6E6"/>
+      </a:lt2>
+      <a:accent1>
+        <a:srgbClr val="5B9BD5"/>
+      </a:accent1>
+      <a:accent2>
+        <a:srgbClr val="ED7D31"/>
+      </a:accent2>
+      <a:accent3>
+        <a:srgbClr val="A5A5A5"/>
+      </a:accent3>
+      <a:accent4>
+        <a:srgbClr val="FFC000"/>
+      </a:accent4>
+      <a:accent5>
+        <a:srgbClr val="4472C4"/>
+      </a:accent5>
+      <a:accent6>
+        <a:srgbClr val="70AD47"/>
+      </a:accent6>
+      <a:hlink>
+        <a:srgbClr val="0563C1"/>
+      </a:hlink>
+      <a:folHlink>
+        <a:srgbClr val="954F72"/>
+      </a:folHlink>
+    </a:clrScheme>
+    <a:fontScheme name="">
+      <a:majorFont>
+        <a:latin typeface="Arial"/>
+        <a:ea typeface="Arial"/>
+        <a:cs typeface="Arial"/>
+      </a:majorFont>
+      <a:minorFont>
+        <a:latin typeface="Arial"/>
+        <a:ea typeface="Arial"/>
+        <a:cs typeface="Arial"/>
+      </a:minorFont>
+    </a:fontScheme>
+    <a:fmtScheme name="Office Theme">
+      <a:fillStyleLst>
+        <a:solidFill>
+          <a:schemeClr val="phClr"/>
+        </a:solidFill>
+        <a:gradFill>
+          <a:gsLst>
+            <a:gs pos="0">
+              <a:schemeClr val="phClr">
+                <a:lumMod val="110000"/>
+                <a:satMod val="105000"/>
+                <a:tint val="67000"/>
+              </a:schemeClr>
+            </a:gs>
+            <a:gs pos="50000">
+              <a:schemeClr val="phClr">
+                <a:lumMod val="105000"/>
+                <a:satMod val="103000"/>
+                <a:tint val="73000"/>
+              </a:schemeClr>
+            </a:gs>
+            <a:gs pos="100000">
+              <a:schemeClr val="phClr">
+                <a:lumMod val="105000"/>
+                <a:satMod val="109000"/>
+                <a:tint val="81000"/>
+              </a:schemeClr>
+            </a:gs>
+          </a:gsLst>
+          <a:lin ang="5400000" scaled="0"/>
+        </a:gradFill>
+        <a:gradFill>
+          <a:gsLst>
+            <a:gs pos="0">
+              <a:schemeClr val="phClr">
+                <a:satMod val="103000"/>
+                <a:lumMod val="102000"/>
+                <a:tint val="94000"/>
+              </a:schemeClr>
+            </a:gs>
+            <a:gs pos="50000">
+              <a:schemeClr val="phClr">
+                <a:satMod val="110000"/>
+                <a:lumMod val="100000"/>
+                <a:shade val="100000"/>
+              </a:schemeClr>
+            </a:gs>
+            <a:gs pos="100000">
+              <a:schemeClr val="phClr">
+                <a:lumMod val="99000"/>
+                <a:satMod val="120000"/>
+                <a:shade val="78000"/>
+              </a:schemeClr>
+            </a:gs>
+          </a:gsLst>
+          <a:lin ang="5400000" scaled="0"/>
+        </a:gradFill>
+      </a:fillStyleLst>
+      <a:lnStyleLst>
+        <a:ln w="6350" cap="flat" cmpd="sng" algn="ctr">
+          <a:solidFill>
+            <a:schemeClr val="phClr"/>
+          </a:solidFill>
+          <a:prstDash val="solid"/>
+          <a:miter lim="800000"/>
+        </a:ln>
+        <a:ln w="12700" cap="flat" cmpd="sng" algn="ctr">
+          <a:solidFill>
+            <a:schemeClr val="phClr"/>
+          </a:solidFill>
+          <a:prstDash val="solid"/>
+          <a:miter lim="800000"/>
+        </a:ln>
+        <a:ln w="19050" cap="flat" cmpd="sng" algn="ctr">
+          <a:solidFill>
+            <a:schemeClr val="phClr"/>
+          </a:solidFill>
+          <a:prstDash val="solid"/>
+          <a:miter lim="800000"/>
+        </a:ln>
+      </a:lnStyleLst>
+      <a:effectStyleLst>
+        <a:effectStyle>
+          <a:effectLst>
+            <a:outerShdw blurRad="40000" dist="20000" dir="5400000" rotWithShape="0">
+              <a:srgbClr val="000000">
+                <a:alpha val="38000"/>
+              </a:srgbClr>
+            </a:outerShdw>
+          </a:effectLst>
+        </a:effectStyle>
+        <a:effectStyle>
+          <a:effectLst>
+            <a:outerShdw blurRad="40000" dist="23000" dir="5400000" rotWithShape="0">
+              <a:srgbClr val="000000">
+                <a:alpha val="35000"/>
+              </a:srgbClr>
+            </a:outerShdw>
+          </a:effectLst>
+        </a:effectStyle>
+        <a:effectStyle>
+          <a:effectLst>
+            <a:outerShdw blurRad="40000" dist="23000" dir="5400000" rotWithShape="0">
+              <a:srgbClr val="000000">
+                <a:alpha val="35000"/>
+              </a:srgbClr>
+            </a:outerShdw>
+          </a:effectLst>
+        </a:effectStyle>
+      </a:effectStyleLst>
+      <a:bgFillStyleLst>
+        <a:solidFill>
+          <a:schemeClr val="phClr"/>
+        </a:solidFill>
+        <a:solidFill>
+          <a:schemeClr val="phClr">
+            <a:tint val="95000"/>
+            <a:satMod val="170000"/>
+          </a:schemeClr>
+        </a:solidFill>
+        <a:gradFill>
+          <a:gsLst>
+            <a:gs pos="0">
+              <a:schemeClr val="phClr">
+                <a:tint val="93000"/>
+                <a:satMod val="150000"/>
+                <a:shade val="98000"/>
+                <a:lumMod val="102000"/>
+              </a:schemeClr>
+            </a:gs>
+            <a:gs pos="50000">
+              <a:schemeClr val="phClr">
+                <a:tint val="98000"/>
+                <a:satMod val="130000"/>
+                <a:shade val="90000"/>
+                <a:lumMod val="103000"/>
+              </a:schemeClr>
+            </a:gs>
+            <a:gs pos="100000">
+              <a:schemeClr val="phClr">
+                <a:shade val="63000"/>
+                <a:satMod val="120000"/>
+              </a:schemeClr>
+            </a:gs>
+          </a:gsLst>
+          <a:lin ang="5400000" scaled="0"/>
+        </a:gradFill>
+      </a:bgFillStyleLst>
+    </a:fmtScheme>
+  </a:themeElements>
+  <a:objectDefaults/>
+</a:theme>
 </file>
</xml_diff>

<commit_message>
A few more video 32 files.
</commit_message>
<xml_diff>
--- a/Thumbnails/00-Traap-Thubnail.pptx
+++ b/Thumbnails/00-Traap-Thubnail.pptx
@@ -3632,7 +3632,7 @@
         <p:spPr bwMode="auto">
           <a:xfrm flipH="0" flipV="0">
             <a:off x="4540770" y="687240"/>
-            <a:ext cx="7151766" cy="1554840"/>
+            <a:ext cx="7167605" cy="1554840"/>
           </a:xfrm>
           <a:prstGeom prst="rect">
             <a:avLst/>
@@ -3655,7 +3655,7 @@
                   </a:schemeClr>
                 </a:solidFill>
               </a:rPr>
-              <a:t>#32 CLIPBOARD IMAGE</a:t>
+              <a:t>#31 NVIMS Update</a:t>
             </a:r>
             <a:br>
               <a:rPr sz="4800">
@@ -3674,7 +3674,7 @@
                   </a:schemeClr>
                 </a:solidFill>
               </a:rPr>
-              <a:t>       for Neovim   </a:t>
+              <a:t>  NeoVim Config Switcher </a:t>
             </a:r>
             <a:endParaRPr sz="4800">
               <a:solidFill>
@@ -3695,7 +3695,7 @@
         <p:spPr bwMode="auto">
           <a:xfrm flipH="0" flipV="0">
             <a:off x="7112277" y="2242080"/>
-            <a:ext cx="4736452" cy="1676759"/>
+            <a:ext cx="4756251" cy="884279"/>
           </a:xfrm>
           <a:prstGeom prst="rect">
             <a:avLst/>
@@ -3707,9 +3707,7 @@
             <a:spAutoFit/>
           </a:bodyPr>
           <a:p>
-            <a:pPr marL="371994" indent="-371994">
-              <a:buFont typeface="Arial"/>
-              <a:buChar char="•"/>
+            <a:pPr lvl="0">
               <a:defRPr/>
             </a:pPr>
             <a:r>
@@ -3718,7 +3716,7 @@
                   <a:srgbClr val="FFFF00"/>
                 </a:solidFill>
               </a:rPr>
-              <a:t>Single solution:</a:t>
+              <a:t>Move Repository</a:t>
             </a:r>
             <a:endParaRPr sz="2600">
               <a:solidFill>
@@ -3727,9 +3725,7 @@
             </a:endParaRPr>
           </a:p>
           <a:p>
-            <a:pPr marL="772044" lvl="1" indent="-371994">
-              <a:buFont typeface="Arial"/>
-              <a:buChar char="•"/>
+            <a:pPr lvl="0">
               <a:defRPr/>
             </a:pPr>
             <a:r>
@@ -3738,47 +3734,7 @@
                   <a:srgbClr val="FFFF00"/>
                 </a:solidFill>
               </a:rPr>
-              <a:t>Arch / Ubuntu</a:t>
-            </a:r>
-            <a:endParaRPr sz="2600">
-              <a:solidFill>
-                <a:srgbClr val="FFFF00"/>
-              </a:solidFill>
-            </a:endParaRPr>
-          </a:p>
-          <a:p>
-            <a:pPr marL="772044" lvl="1" indent="-371994">
-              <a:buFont typeface="Arial"/>
-              <a:buChar char="•"/>
-              <a:defRPr/>
-            </a:pPr>
-            <a:r>
-              <a:rPr sz="2600">
-                <a:solidFill>
-                  <a:srgbClr val="FFFF00"/>
-                </a:solidFill>
-              </a:rPr>
-              <a:t>Window 10 / 11</a:t>
-            </a:r>
-            <a:endParaRPr sz="2600">
-              <a:solidFill>
-                <a:srgbClr val="FFFF00"/>
-              </a:solidFill>
-            </a:endParaRPr>
-          </a:p>
-          <a:p>
-            <a:pPr marL="772044" lvl="1" indent="-371994">
-              <a:buFont typeface="Arial"/>
-              <a:buChar char="•"/>
-              <a:defRPr/>
-            </a:pPr>
-            <a:r>
-              <a:rPr sz="2600">
-                <a:solidFill>
-                  <a:srgbClr val="FFFF00"/>
-                </a:solidFill>
-              </a:rPr>
-              <a:t>WSL2 + </a:t>
+              <a:t>https://github.com/Traap/nvims</a:t>
             </a:r>
             <a:endParaRPr sz="2600">
               <a:solidFill>

</xml_diff>